<commit_message>
changed images in ppt
</commit_message>
<xml_diff>
--- a/slides/final_bootcamp_project.pptx
+++ b/slides/final_bootcamp_project.pptx
@@ -4731,35 +4731,6 @@
           </a:prstGeom>
         </p:spPr>
       </p:pic>
-      <p:pic>
-        <p:nvPicPr>
-          <p:cNvPr id="11" name="Picture 10">
-            <a:extLst>
-              <a:ext uri="{FF2B5EF4-FFF2-40B4-BE49-F238E27FC236}">
-                <a16:creationId xmlns:a16="http://schemas.microsoft.com/office/drawing/2014/main" id="{D3E4C681-E82B-EA30-AE63-6545C2C794F5}"/>
-              </a:ext>
-            </a:extLst>
-          </p:cNvPr>
-          <p:cNvPicPr>
-            <a:picLocks noChangeAspect="1"/>
-          </p:cNvPicPr>
-          <p:nvPr/>
-        </p:nvPicPr>
-        <p:blipFill rotWithShape="1">
-          <a:blip r:embed="rId4"/>
-          <a:srcRect r="1836"/>
-          <a:stretch/>
-        </p:blipFill>
-        <p:spPr>
-          <a:xfrm>
-            <a:off x="8054424" y="634237"/>
-            <a:ext cx="3883874" cy="3018784"/>
-          </a:xfrm>
-          <a:prstGeom prst="rect">
-            <a:avLst/>
-          </a:prstGeom>
-        </p:spPr>
-      </p:pic>
       <p:sp>
         <p:nvSpPr>
           <p:cNvPr id="9" name="Text Placeholder 4">
@@ -5013,8 +4984,8 @@
           </a:lstStyle>
           <a:p>
             <a:r>
-              <a:rPr lang="en-US" dirty="0"/>
-              <a:t>Decision Tree</a:t>
+              <a:rPr lang="en-US" dirty="0" err="1"/>
+              <a:t>knn</a:t>
             </a:r>
             <a:endParaRPr lang="en-IN" dirty="0"/>
           </a:p>
@@ -5026,6 +4997,36 @@
             <a:extLst>
               <a:ext uri="{FF2B5EF4-FFF2-40B4-BE49-F238E27FC236}">
                 <a16:creationId xmlns:a16="http://schemas.microsoft.com/office/drawing/2014/main" id="{238DBCD9-5CE0-E868-EBE5-5D1DFD43A86E}"/>
+              </a:ext>
+            </a:extLst>
+          </p:cNvPr>
+          <p:cNvPicPr>
+            <a:picLocks noChangeAspect="1"/>
+          </p:cNvPicPr>
+          <p:nvPr/>
+        </p:nvPicPr>
+        <p:blipFill>
+          <a:blip r:embed="rId4"/>
+          <a:stretch>
+            <a:fillRect/>
+          </a:stretch>
+        </p:blipFill>
+        <p:spPr>
+          <a:xfrm>
+            <a:off x="3872235" y="3246843"/>
+            <a:ext cx="4329037" cy="3365542"/>
+          </a:xfrm>
+          <a:prstGeom prst="rect">
+            <a:avLst/>
+          </a:prstGeom>
+        </p:spPr>
+      </p:pic>
+      <p:pic>
+        <p:nvPicPr>
+          <p:cNvPr id="6" name="Picture 5">
+            <a:extLst>
+              <a:ext uri="{FF2B5EF4-FFF2-40B4-BE49-F238E27FC236}">
+                <a16:creationId xmlns:a16="http://schemas.microsoft.com/office/drawing/2014/main" id="{E8C6972E-1A40-B315-08E6-5496A1214356}"/>
               </a:ext>
             </a:extLst>
           </p:cNvPr>
@@ -5042,8 +5043,8 @@
         </p:blipFill>
         <p:spPr>
           <a:xfrm>
-            <a:off x="4001179" y="3319343"/>
-            <a:ext cx="4329037" cy="3365542"/>
+            <a:off x="8087496" y="554358"/>
+            <a:ext cx="3855474" cy="2951392"/>
           </a:xfrm>
           <a:prstGeom prst="rect">
             <a:avLst/>
@@ -5230,7 +5231,7 @@
         <p:spPr>
           <a:xfrm>
             <a:off x="1100831" y="1607750"/>
-            <a:ext cx="9188388" cy="3514666"/>
+            <a:ext cx="9188388" cy="2156382"/>
           </a:xfrm>
           <a:solidFill>
             <a:schemeClr val="accent5">
@@ -5277,25 +5278,8 @@
             </a:r>
           </a:p>
           <a:p>
-            <a:pPr algn="l">
-              <a:buFont typeface="+mj-lt"/>
-              <a:buAutoNum type="arabicPeriod"/>
-            </a:pPr>
-            <a:r>
-              <a:rPr lang="en-US" sz="2400" b="0" i="0" dirty="0">
-                <a:solidFill>
-                  <a:srgbClr val="374151"/>
-                </a:solidFill>
-                <a:effectLst/>
-                <a:latin typeface="Söhne"/>
-              </a:rPr>
-              <a:t>Despite the Decision Tree Regressor showing perfect performance, the ensemble nature of the Random Forest Regressor makes it a more suitable choice for this project.</a:t>
-            </a:r>
-          </a:p>
-          <a:p>
-            <a:pPr algn="l">
-              <a:buFont typeface="Arial" panose="020B0604020202020204" pitchFamily="34" charset="0"/>
-              <a:buChar char="•"/>
+            <a:pPr marL="45720" indent="0" algn="l">
+              <a:buNone/>
             </a:pPr>
             <a:endParaRPr lang="en-US" sz="3200" b="0" i="0" dirty="0">
               <a:solidFill>

</xml_diff>

<commit_message>
update slide with app
</commit_message>
<xml_diff>
--- a/slides/final_bootcamp_project.pptx
+++ b/slides/final_bootcamp_project.pptx
@@ -5117,32 +5117,59 @@
           </a:p>
         </p:txBody>
       </p:sp>
+      <p:sp>
+        <p:nvSpPr>
+          <p:cNvPr id="4" name="Content Placeholder 3">
+            <a:extLst>
+              <a:ext uri="{FF2B5EF4-FFF2-40B4-BE49-F238E27FC236}">
+                <a16:creationId xmlns:a16="http://schemas.microsoft.com/office/drawing/2014/main" id="{D14ACE05-69E1-AF07-0845-AE3E7367A59B}"/>
+              </a:ext>
+            </a:extLst>
+          </p:cNvPr>
+          <p:cNvSpPr>
+            <a:spLocks noGrp="1"/>
+          </p:cNvSpPr>
+          <p:nvPr>
+            <p:ph idx="1"/>
+          </p:nvPr>
+        </p:nvSpPr>
+        <p:spPr/>
+        <p:txBody>
+          <a:bodyPr/>
+          <a:lstStyle/>
+          <a:p>
+            <a:endParaRPr lang="en-IN"/>
+          </a:p>
+        </p:txBody>
+      </p:sp>
       <p:pic>
         <p:nvPicPr>
-          <p:cNvPr id="5" name="Content Placeholder 4">
+          <p:cNvPr id="7" name="Picture 6">
             <a:extLst>
               <a:ext uri="{FF2B5EF4-FFF2-40B4-BE49-F238E27FC236}">
-                <a16:creationId xmlns:a16="http://schemas.microsoft.com/office/drawing/2014/main" id="{148E029A-AAD3-3D44-5B89-EE608FBAB985}"/>
+                <a16:creationId xmlns:a16="http://schemas.microsoft.com/office/drawing/2014/main" id="{9EA3703C-AC64-29A0-3EF2-F5FEE96F7274}"/>
               </a:ext>
             </a:extLst>
           </p:cNvPr>
           <p:cNvPicPr>
-            <a:picLocks noGrp="1" noChangeAspect="1"/>
+            <a:picLocks noChangeAspect="1"/>
           </p:cNvPicPr>
-          <p:nvPr>
-            <p:ph idx="1"/>
-          </p:nvPr>
+          <p:nvPr/>
         </p:nvPicPr>
-        <p:blipFill rotWithShape="1">
+        <p:blipFill>
           <a:blip r:embed="rId2"/>
-          <a:srcRect l="7157" t="11717" r="3687" b="727"/>
-          <a:stretch/>
+          <a:stretch>
+            <a:fillRect/>
+          </a:stretch>
         </p:blipFill>
         <p:spPr>
           <a:xfrm>
-            <a:off x="904338" y="704330"/>
-            <a:ext cx="10129422" cy="5929956"/>
+            <a:off x="266326" y="870012"/>
+            <a:ext cx="11575611" cy="5682366"/>
           </a:xfrm>
+          <a:prstGeom prst="rect">
+            <a:avLst/>
+          </a:prstGeom>
         </p:spPr>
       </p:pic>
     </p:spTree>

</xml_diff>

<commit_message>
update slides with latest info
</commit_message>
<xml_diff>
--- a/slides/final_bootcamp_project.pptx
+++ b/slides/final_bootcamp_project.pptx
@@ -4493,12 +4493,57 @@
           </a:p>
         </p:txBody>
       </p:sp>
+      <p:sp>
+        <p:nvSpPr>
+          <p:cNvPr id="9" name="TextBox 8">
+            <a:extLst>
+              <a:ext uri="{FF2B5EF4-FFF2-40B4-BE49-F238E27FC236}">
+                <a16:creationId xmlns:a16="http://schemas.microsoft.com/office/drawing/2014/main" id="{7EF4C46D-7B9B-C7A4-E61F-654DCB4AE441}"/>
+              </a:ext>
+            </a:extLst>
+          </p:cNvPr>
+          <p:cNvSpPr txBox="1"/>
+          <p:nvPr/>
+        </p:nvSpPr>
+        <p:spPr>
+          <a:xfrm>
+            <a:off x="9321553" y="2041864"/>
+            <a:ext cx="2024109" cy="1938992"/>
+          </a:xfrm>
+          <a:prstGeom prst="rect">
+            <a:avLst/>
+          </a:prstGeom>
+          <a:solidFill>
+            <a:schemeClr val="accent1">
+              <a:lumMod val="20000"/>
+              <a:lumOff val="80000"/>
+            </a:schemeClr>
+          </a:solidFill>
+        </p:spPr>
+        <p:txBody>
+          <a:bodyPr wrap="square" rtlCol="0">
+            <a:spAutoFit/>
+          </a:bodyPr>
+          <a:lstStyle/>
+          <a:p>
+            <a:r>
+              <a:rPr lang="en-US" sz="2400" dirty="0"/>
+              <a:t>Engagement increases over period of time specially for view count</a:t>
+            </a:r>
+            <a:r>
+              <a:rPr lang="en-US" dirty="0"/>
+              <a:t>. </a:t>
+            </a:r>
+            <a:endParaRPr lang="en-IN" dirty="0"/>
+          </a:p>
+        </p:txBody>
+      </p:sp>
       <p:pic>
         <p:nvPicPr>
-          <p:cNvPr id="8" name="Picture 7">
+          <p:cNvPr id="4" name="Picture 3">
             <a:extLst>
               <a:ext uri="{FF2B5EF4-FFF2-40B4-BE49-F238E27FC236}">
-                <a16:creationId xmlns:a16="http://schemas.microsoft.com/office/drawing/2014/main" id="{B68B667C-3903-25B2-47BB-CF3495D682B3}"/>
+                <a16:creationId xmlns:a16="http://schemas.microsoft.com/office/drawing/2014/main" id="{78977C73-57FC-CA9E-7B7E-97DF81A30F01}"/>
               </a:ext>
             </a:extLst>
           </p:cNvPr>
@@ -4515,59 +4560,14 @@
         </p:blipFill>
         <p:spPr>
           <a:xfrm>
-            <a:off x="630314" y="951488"/>
-            <a:ext cx="8584707" cy="5545058"/>
+            <a:off x="460991" y="916712"/>
+            <a:ext cx="8848725" cy="5648325"/>
           </a:xfrm>
           <a:prstGeom prst="rect">
             <a:avLst/>
           </a:prstGeom>
         </p:spPr>
       </p:pic>
-      <p:sp>
-        <p:nvSpPr>
-          <p:cNvPr id="9" name="TextBox 8">
-            <a:extLst>
-              <a:ext uri="{FF2B5EF4-FFF2-40B4-BE49-F238E27FC236}">
-                <a16:creationId xmlns:a16="http://schemas.microsoft.com/office/drawing/2014/main" id="{7EF4C46D-7B9B-C7A4-E61F-654DCB4AE441}"/>
-              </a:ext>
-            </a:extLst>
-          </p:cNvPr>
-          <p:cNvSpPr txBox="1"/>
-          <p:nvPr/>
-        </p:nvSpPr>
-        <p:spPr>
-          <a:xfrm>
-            <a:off x="9321553" y="2041864"/>
-            <a:ext cx="2024109" cy="1938992"/>
-          </a:xfrm>
-          <a:prstGeom prst="rect">
-            <a:avLst/>
-          </a:prstGeom>
-          <a:solidFill>
-            <a:schemeClr val="accent1">
-              <a:lumMod val="20000"/>
-              <a:lumOff val="80000"/>
-            </a:schemeClr>
-          </a:solidFill>
-        </p:spPr>
-        <p:txBody>
-          <a:bodyPr wrap="square" rtlCol="0">
-            <a:spAutoFit/>
-          </a:bodyPr>
-          <a:lstStyle/>
-          <a:p>
-            <a:r>
-              <a:rPr lang="en-US" sz="2400" dirty="0"/>
-              <a:t>Engagement increases over period of time specially for view count</a:t>
-            </a:r>
-            <a:r>
-              <a:rPr lang="en-US" dirty="0"/>
-              <a:t>. </a:t>
-            </a:r>
-            <a:endParaRPr lang="en-IN" dirty="0"/>
-          </a:p>
-        </p:txBody>
-      </p:sp>
     </p:spTree>
     <p:extLst>
       <p:ext uri="{BB962C8B-B14F-4D97-AF65-F5344CB8AC3E}">
@@ -4686,7 +4686,7 @@
         </p:nvSpPr>
         <p:spPr>
           <a:xfrm>
-            <a:off x="5140842" y="2738846"/>
+            <a:off x="5140842" y="2907522"/>
             <a:ext cx="2210540" cy="777240"/>
           </a:xfrm>
         </p:spPr>
@@ -4702,35 +4702,6 @@
           </a:p>
         </p:txBody>
       </p:sp>
-      <p:pic>
-        <p:nvPicPr>
-          <p:cNvPr id="8" name="Picture 7">
-            <a:extLst>
-              <a:ext uri="{FF2B5EF4-FFF2-40B4-BE49-F238E27FC236}">
-                <a16:creationId xmlns:a16="http://schemas.microsoft.com/office/drawing/2014/main" id="{EBF1BB25-5142-6DDB-5F60-45DA45FAC9F2}"/>
-              </a:ext>
-            </a:extLst>
-          </p:cNvPr>
-          <p:cNvPicPr>
-            <a:picLocks noChangeAspect="1"/>
-          </p:cNvPicPr>
-          <p:nvPr/>
-        </p:nvPicPr>
-        <p:blipFill rotWithShape="1">
-          <a:blip r:embed="rId3"/>
-          <a:srcRect l="2792" t="-5761" r="1552" b="7374"/>
-          <a:stretch/>
-        </p:blipFill>
-        <p:spPr>
-          <a:xfrm>
-            <a:off x="249030" y="1337116"/>
-            <a:ext cx="3612756" cy="2842545"/>
-          </a:xfrm>
-          <a:prstGeom prst="rect">
-            <a:avLst/>
-          </a:prstGeom>
-        </p:spPr>
-      </p:pic>
       <p:sp>
         <p:nvSpPr>
           <p:cNvPr id="9" name="Text Placeholder 4">
@@ -4993,10 +4964,40 @@
       </p:sp>
       <p:pic>
         <p:nvPicPr>
-          <p:cNvPr id="14" name="Picture 13">
+          <p:cNvPr id="11" name="Picture 10">
             <a:extLst>
               <a:ext uri="{FF2B5EF4-FFF2-40B4-BE49-F238E27FC236}">
-                <a16:creationId xmlns:a16="http://schemas.microsoft.com/office/drawing/2014/main" id="{238DBCD9-5CE0-E868-EBE5-5D1DFD43A86E}"/>
+                <a16:creationId xmlns:a16="http://schemas.microsoft.com/office/drawing/2014/main" id="{914969C9-4399-A387-D714-83FBB776A434}"/>
+              </a:ext>
+            </a:extLst>
+          </p:cNvPr>
+          <p:cNvPicPr>
+            <a:picLocks noChangeAspect="1"/>
+          </p:cNvPicPr>
+          <p:nvPr/>
+        </p:nvPicPr>
+        <p:blipFill>
+          <a:blip r:embed="rId3"/>
+          <a:stretch>
+            <a:fillRect/>
+          </a:stretch>
+        </p:blipFill>
+        <p:spPr>
+          <a:xfrm>
+            <a:off x="3950563" y="3506684"/>
+            <a:ext cx="4989251" cy="3071674"/>
+          </a:xfrm>
+          <a:prstGeom prst="rect">
+            <a:avLst/>
+          </a:prstGeom>
+        </p:spPr>
+      </p:pic>
+      <p:pic>
+        <p:nvPicPr>
+          <p:cNvPr id="13" name="Picture 12">
+            <a:extLst>
+              <a:ext uri="{FF2B5EF4-FFF2-40B4-BE49-F238E27FC236}">
+                <a16:creationId xmlns:a16="http://schemas.microsoft.com/office/drawing/2014/main" id="{40A40F95-C80F-D6B3-2FB0-874F0C1F87FC}"/>
               </a:ext>
             </a:extLst>
           </p:cNvPr>
@@ -5013,8 +5014,8 @@
         </p:blipFill>
         <p:spPr>
           <a:xfrm>
-            <a:off x="3872235" y="3246843"/>
-            <a:ext cx="4329037" cy="3365542"/>
+            <a:off x="360375" y="1467968"/>
+            <a:ext cx="3900125" cy="3036881"/>
           </a:xfrm>
           <a:prstGeom prst="rect">
             <a:avLst/>
@@ -5023,10 +5024,10 @@
       </p:pic>
       <p:pic>
         <p:nvPicPr>
-          <p:cNvPr id="6" name="Picture 5">
+          <p:cNvPr id="16" name="Picture 15">
             <a:extLst>
               <a:ext uri="{FF2B5EF4-FFF2-40B4-BE49-F238E27FC236}">
-                <a16:creationId xmlns:a16="http://schemas.microsoft.com/office/drawing/2014/main" id="{E8C6972E-1A40-B315-08E6-5496A1214356}"/>
+                <a16:creationId xmlns:a16="http://schemas.microsoft.com/office/drawing/2014/main" id="{7A09D7B8-8623-6A4B-D995-A776A3D41FEA}"/>
               </a:ext>
             </a:extLst>
           </p:cNvPr>
@@ -5043,8 +5044,8 @@
         </p:blipFill>
         <p:spPr>
           <a:xfrm>
-            <a:off x="8087496" y="554358"/>
-            <a:ext cx="3855474" cy="2951392"/>
+            <a:off x="8231725" y="571129"/>
+            <a:ext cx="3660838" cy="2881434"/>
           </a:xfrm>
           <a:prstGeom prst="rect">
             <a:avLst/>
@@ -5138,16 +5139,16 @@
           <a:bodyPr/>
           <a:lstStyle/>
           <a:p>
-            <a:endParaRPr lang="en-IN"/>
+            <a:endParaRPr lang="en-IN" dirty="0"/>
           </a:p>
         </p:txBody>
       </p:sp>
       <p:pic>
         <p:nvPicPr>
-          <p:cNvPr id="7" name="Picture 6">
+          <p:cNvPr id="9" name="Picture 8">
             <a:extLst>
               <a:ext uri="{FF2B5EF4-FFF2-40B4-BE49-F238E27FC236}">
-                <a16:creationId xmlns:a16="http://schemas.microsoft.com/office/drawing/2014/main" id="{9EA3703C-AC64-29A0-3EF2-F5FEE96F7274}"/>
+                <a16:creationId xmlns:a16="http://schemas.microsoft.com/office/drawing/2014/main" id="{A20F6817-CC36-58CE-BA83-2F4CECB7214E}"/>
               </a:ext>
             </a:extLst>
           </p:cNvPr>
@@ -5164,8 +5165,8 @@
         </p:blipFill>
         <p:spPr>
           <a:xfrm>
-            <a:off x="266326" y="870012"/>
-            <a:ext cx="11575611" cy="5682366"/>
+            <a:off x="347708" y="961312"/>
+            <a:ext cx="11496583" cy="5634803"/>
           </a:xfrm>
           <a:prstGeom prst="rect">
             <a:avLst/>

</xml_diff>